<commit_message>
updated final slice deck
</commit_message>
<xml_diff>
--- a/Education in America.pptx
+++ b/Education in America.pptx
@@ -15,8 +15,9 @@
     <p:sldId id="291" r:id="rId12"/>
     <p:sldId id="292" r:id="rId13"/>
     <p:sldId id="293" r:id="rId14"/>
-    <p:sldId id="295" r:id="rId15"/>
+    <p:sldId id="297" r:id="rId15"/>
     <p:sldId id="294" r:id="rId16"/>
+    <p:sldId id="296" r:id="rId17"/>
   </p:sldIdLst>
   <p:sldSz cx="12192000" cy="6858000"/>
   <p:notesSz cx="6858000" cy="9144000"/>
@@ -130,8 +131,9 @@
             <p14:sldId id="291"/>
             <p14:sldId id="292"/>
             <p14:sldId id="293"/>
-            <p14:sldId id="295"/>
+            <p14:sldId id="297"/>
             <p14:sldId id="294"/>
+            <p14:sldId id="296"/>
           </p14:sldIdLst>
         </p14:section>
         <p14:section name="Untitled Section" id="{0F7C94F2-3BBD-48D1-8D05-D586E3792BEF}">
@@ -9487,7 +9489,7 @@
           <a:p>
             <a:fld id="{88D38747-4367-4BD2-8D51-C97E202738E2}" type="datetime1">
               <a:rPr lang="en-US" smtClean="0"/>
-              <a:t>4/17/2020</a:t>
+              <a:t>4/18/2020</a:t>
             </a:fld>
             <a:endParaRPr lang="en-US" dirty="0"/>
           </a:p>
@@ -9792,7 +9794,7 @@
           <a:p>
             <a:fld id="{11F1B079-7EF0-44EE-B798-BCC497C9F3B2}" type="datetime1">
               <a:rPr lang="en-US" smtClean="0"/>
-              <a:t>4/17/2020</a:t>
+              <a:t>4/18/2020</a:t>
             </a:fld>
             <a:endParaRPr lang="en-US" dirty="0"/>
           </a:p>
@@ -9986,7 +9988,7 @@
           <a:p>
             <a:fld id="{28FF70A8-1D13-4657-95F0-A9EA54967B8D}" type="datetime1">
               <a:rPr lang="en-US" smtClean="0"/>
-              <a:t>4/17/2020</a:t>
+              <a:t>4/18/2020</a:t>
             </a:fld>
             <a:endParaRPr lang="en-US" dirty="0"/>
           </a:p>
@@ -10249,7 +10251,7 @@
           <a:p>
             <a:fld id="{21EB90AC-71BD-4C7F-8ACA-7B3F18292E63}" type="datetime1">
               <a:rPr lang="en-US" smtClean="0"/>
-              <a:t>4/17/2020</a:t>
+              <a:t>4/18/2020</a:t>
             </a:fld>
             <a:endParaRPr lang="en-US" dirty="0"/>
           </a:p>
@@ -10685,7 +10687,7 @@
           <a:p>
             <a:fld id="{4E6EFC2C-8905-46F0-B443-CE905B76BA01}" type="datetime1">
               <a:rPr lang="en-US" smtClean="0"/>
-              <a:t>4/17/2020</a:t>
+              <a:t>4/18/2020</a:t>
             </a:fld>
             <a:endParaRPr lang="en-US" dirty="0"/>
           </a:p>
@@ -11222,7 +11224,7 @@
           <a:p>
             <a:fld id="{D9079DC3-C9B5-499E-9140-0DC28B7074E2}" type="datetime1">
               <a:rPr lang="en-US" smtClean="0"/>
-              <a:t>4/17/2020</a:t>
+              <a:t>4/18/2020</a:t>
             </a:fld>
             <a:endParaRPr lang="en-US" dirty="0"/>
           </a:p>
@@ -12104,7 +12106,7 @@
           <a:p>
             <a:fld id="{30BB33EA-E472-4D22-9C03-A9C14AA21CED}" type="datetime1">
               <a:rPr lang="en-US" smtClean="0"/>
-              <a:t>4/17/2020</a:t>
+              <a:t>4/18/2020</a:t>
             </a:fld>
             <a:endParaRPr lang="en-US" dirty="0"/>
           </a:p>
@@ -12274,7 +12276,7 @@
           <a:p>
             <a:fld id="{73C55A3C-5767-4844-A0A3-83778C2E5409}" type="datetime1">
               <a:rPr lang="en-US" smtClean="0"/>
-              <a:t>4/17/2020</a:t>
+              <a:t>4/18/2020</a:t>
             </a:fld>
             <a:endParaRPr lang="en-US" dirty="0"/>
           </a:p>
@@ -12518,7 +12520,7 @@
           <a:p>
             <a:fld id="{CAE507A8-A5CF-4D38-AB86-7EDDA87A85D4}" type="datetime1">
               <a:rPr lang="en-US" smtClean="0"/>
-              <a:t>4/17/2020</a:t>
+              <a:t>4/18/2020</a:t>
             </a:fld>
             <a:endParaRPr lang="en-US" dirty="0"/>
           </a:p>
@@ -12760,7 +12762,7 @@
           <a:p>
             <a:fld id="{BDFCD27C-8599-43EF-BA1D-14DDC1946E06}" type="datetime1">
               <a:rPr lang="en-US" smtClean="0"/>
-              <a:t>4/17/2020</a:t>
+              <a:t>4/18/2020</a:t>
             </a:fld>
             <a:endParaRPr lang="en-US" dirty="0"/>
           </a:p>
@@ -13243,7 +13245,7 @@
           <a:p>
             <a:fld id="{49343D99-809A-49C0-96E5-4250D0B498EE}" type="datetime1">
               <a:rPr lang="en-US" smtClean="0"/>
-              <a:t>4/17/2020</a:t>
+              <a:t>4/18/2020</a:t>
             </a:fld>
             <a:endParaRPr lang="en-US" dirty="0"/>
           </a:p>
@@ -13361,7 +13363,7 @@
           <a:p>
             <a:fld id="{A143DE9B-B678-4EFB-BB7D-A4370204A0B0}" type="datetime1">
               <a:rPr lang="en-US" smtClean="0"/>
-              <a:t>4/17/2020</a:t>
+              <a:t>4/18/2020</a:t>
             </a:fld>
             <a:endParaRPr lang="en-US" dirty="0"/>
           </a:p>
@@ -13456,7 +13458,7 @@
           <a:p>
             <a:fld id="{E68812DA-F765-4142-A6A3-A8ED7235E082}" type="datetime1">
               <a:rPr lang="en-US" smtClean="0"/>
-              <a:t>4/17/2020</a:t>
+              <a:t>4/18/2020</a:t>
             </a:fld>
             <a:endParaRPr lang="en-US" dirty="0"/>
           </a:p>
@@ -13711,7 +13713,7 @@
           <a:p>
             <a:fld id="{3E0277FD-7DE6-41D4-930D-AC99F5AFE54E}" type="datetime1">
               <a:rPr lang="en-US" smtClean="0"/>
-              <a:t>4/17/2020</a:t>
+              <a:t>4/18/2020</a:t>
             </a:fld>
             <a:endParaRPr lang="en-US" dirty="0"/>
           </a:p>
@@ -14018,7 +14020,7 @@
           <a:p>
             <a:fld id="{9EA15526-7079-4B7B-987C-1B5FAE11A0FF}" type="datetime1">
               <a:rPr lang="en-US" smtClean="0"/>
-              <a:t>4/17/2020</a:t>
+              <a:t>4/18/2020</a:t>
             </a:fld>
             <a:endParaRPr lang="en-US" dirty="0"/>
           </a:p>
@@ -14253,7 +14255,7 @@
           <a:p>
             <a:fld id="{073ED0CC-082F-4160-86E5-0D6041F12778}" type="datetime1">
               <a:rPr lang="en-US" smtClean="0"/>
-              <a:t>4/17/2020</a:t>
+              <a:t>4/18/2020</a:t>
             </a:fld>
             <a:endParaRPr lang="en-US" dirty="0"/>
           </a:p>
@@ -15168,7 +15170,7 @@
           </a:effectLst>
           <a:extLst>
             <a:ext uri="{91240B29-F687-4f45-9708-019B960494DF}">
-              <a14:hiddenLine xmlns:a16="http://schemas.microsoft.com/office/drawing/2014/main" xmlns:p14="http://schemas.microsoft.com/office/powerpoint/2010/main" xmlns:a14="http://schemas.microsoft.com/office/drawing/2010/main" xmlns="" w="9525">
+              <a14:hiddenLine xmlns="" xmlns:a14="http://schemas.microsoft.com/office/drawing/2010/main" xmlns:p14="http://schemas.microsoft.com/office/powerpoint/2010/main" xmlns:a16="http://schemas.microsoft.com/office/drawing/2014/main" w="9525">
                 <a:solidFill>
                   <a:srgbClr val="000000"/>
                 </a:solidFill>
@@ -15965,36 +15967,6 @@
           </a:p>
         </p:txBody>
       </p:sp>
-      <p:pic>
-        <p:nvPicPr>
-          <p:cNvPr id="5" name="Picture 4" descr="A close up of a map&#10;&#10;Description automatically generated">
-            <a:extLst>
-              <a:ext uri="{FF2B5EF4-FFF2-40B4-BE49-F238E27FC236}">
-                <a16:creationId xmlns:a16="http://schemas.microsoft.com/office/drawing/2014/main" id="{EE407BF1-4A59-4C0F-AD20-D90C0CEE53F1}"/>
-              </a:ext>
-            </a:extLst>
-          </p:cNvPr>
-          <p:cNvPicPr>
-            <a:picLocks noChangeAspect="1"/>
-          </p:cNvPicPr>
-          <p:nvPr/>
-        </p:nvPicPr>
-        <p:blipFill>
-          <a:blip r:embed="rId2"/>
-          <a:stretch>
-            <a:fillRect/>
-          </a:stretch>
-        </p:blipFill>
-        <p:spPr>
-          <a:xfrm>
-            <a:off x="3591718" y="618148"/>
-            <a:ext cx="8387219" cy="5621703"/>
-          </a:xfrm>
-          <a:prstGeom prst="rect">
-            <a:avLst/>
-          </a:prstGeom>
-        </p:spPr>
-      </p:pic>
       <p:sp>
         <p:nvSpPr>
           <p:cNvPr id="6" name="Title 5">
@@ -16030,10 +16002,40 @@
           </a:p>
         </p:txBody>
       </p:sp>
+      <p:pic>
+        <p:nvPicPr>
+          <p:cNvPr id="4" name="Picture 3" descr="A picture containing text, map&#10;&#10;Description automatically generated">
+            <a:extLst>
+              <a:ext uri="{FF2B5EF4-FFF2-40B4-BE49-F238E27FC236}">
+                <a16:creationId xmlns:a16="http://schemas.microsoft.com/office/drawing/2014/main" id="{E2951ABA-0B10-4A8A-B700-2C8B5027604B}"/>
+              </a:ext>
+            </a:extLst>
+          </p:cNvPr>
+          <p:cNvPicPr>
+            <a:picLocks noChangeAspect="1"/>
+          </p:cNvPicPr>
+          <p:nvPr/>
+        </p:nvPicPr>
+        <p:blipFill>
+          <a:blip r:embed="rId2"/>
+          <a:stretch>
+            <a:fillRect/>
+          </a:stretch>
+        </p:blipFill>
+        <p:spPr>
+          <a:xfrm>
+            <a:off x="3481133" y="445207"/>
+            <a:ext cx="8757032" cy="5967586"/>
+          </a:xfrm>
+          <a:prstGeom prst="rect">
+            <a:avLst/>
+          </a:prstGeom>
+        </p:spPr>
+      </p:pic>
     </p:spTree>
     <p:extLst>
       <p:ext uri="{BB962C8B-B14F-4D97-AF65-F5344CB8AC3E}">
-        <p14:creationId xmlns:p14="http://schemas.microsoft.com/office/powerpoint/2010/main" val="1662076037"/>
+        <p14:creationId xmlns:p14="http://schemas.microsoft.com/office/powerpoint/2010/main" val="1162453086"/>
       </p:ext>
     </p:extLst>
   </p:cSld>
@@ -16170,6 +16172,168 @@
     <p:extLst>
       <p:ext uri="{BB962C8B-B14F-4D97-AF65-F5344CB8AC3E}">
         <p14:creationId xmlns:p14="http://schemas.microsoft.com/office/powerpoint/2010/main" val="4272263294"/>
+      </p:ext>
+    </p:extLst>
+  </p:cSld>
+  <p:clrMapOvr>
+    <a:masterClrMapping/>
+  </p:clrMapOvr>
+</p:sld>
+</file>
+
+<file path=ppt/slides/slide13.xml><?xml version="1.0" encoding="utf-8"?>
+<p:sld xmlns:a="http://schemas.openxmlformats.org/drawingml/2006/main" xmlns:r="http://schemas.openxmlformats.org/officeDocument/2006/relationships" xmlns:p="http://schemas.openxmlformats.org/presentationml/2006/main">
+  <p:cSld>
+    <p:spTree>
+      <p:nvGrpSpPr>
+        <p:cNvPr id="1" name=""/>
+        <p:cNvGrpSpPr/>
+        <p:nvPr/>
+      </p:nvGrpSpPr>
+      <p:grpSpPr>
+        <a:xfrm>
+          <a:off x="0" y="0"/>
+          <a:ext cx="0" cy="0"/>
+          <a:chOff x="0" y="0"/>
+          <a:chExt cx="0" cy="0"/>
+        </a:xfrm>
+      </p:grpSpPr>
+      <p:sp>
+        <p:nvSpPr>
+          <p:cNvPr id="2" name="Title 1">
+            <a:extLst>
+              <a:ext uri="{FF2B5EF4-FFF2-40B4-BE49-F238E27FC236}">
+                <a16:creationId xmlns:a16="http://schemas.microsoft.com/office/drawing/2014/main" id="{1CE70E73-5BD7-420A-ACF7-ECD27D28B991}"/>
+              </a:ext>
+            </a:extLst>
+          </p:cNvPr>
+          <p:cNvSpPr>
+            <a:spLocks noGrp="1"/>
+          </p:cNvSpPr>
+          <p:nvPr>
+            <p:ph type="title"/>
+          </p:nvPr>
+        </p:nvSpPr>
+        <p:spPr/>
+        <p:txBody>
+          <a:bodyPr/>
+          <a:lstStyle/>
+          <a:p>
+            <a:r>
+              <a:rPr lang="en-US" dirty="0"/>
+              <a:t>Data Limitations and Conclusions</a:t>
+            </a:r>
+          </a:p>
+        </p:txBody>
+      </p:sp>
+      <p:sp>
+        <p:nvSpPr>
+          <p:cNvPr id="3" name="Content Placeholder 2">
+            <a:extLst>
+              <a:ext uri="{FF2B5EF4-FFF2-40B4-BE49-F238E27FC236}">
+                <a16:creationId xmlns:a16="http://schemas.microsoft.com/office/drawing/2014/main" id="{47C027B6-1C4D-4D60-9287-C202A8EB18EC}"/>
+              </a:ext>
+            </a:extLst>
+          </p:cNvPr>
+          <p:cNvSpPr>
+            <a:spLocks noGrp="1"/>
+          </p:cNvSpPr>
+          <p:nvPr>
+            <p:ph idx="1"/>
+          </p:nvPr>
+        </p:nvSpPr>
+        <p:spPr>
+          <a:xfrm>
+            <a:off x="913795" y="1866900"/>
+            <a:ext cx="10353762" cy="4516145"/>
+          </a:xfrm>
+        </p:spPr>
+        <p:txBody>
+          <a:bodyPr>
+            <a:noAutofit/>
+          </a:bodyPr>
+          <a:lstStyle/>
+          <a:p>
+            <a:r>
+              <a:rPr lang="en-US" sz="1800" dirty="0"/>
+              <a:t>Limitations</a:t>
+            </a:r>
+          </a:p>
+          <a:p>
+            <a:pPr lvl="1"/>
+            <a:r>
+              <a:rPr lang="en-US" sz="1600" dirty="0"/>
+              <a:t>All data is self-reported</a:t>
+            </a:r>
+          </a:p>
+          <a:p>
+            <a:pPr lvl="1"/>
+            <a:r>
+              <a:rPr lang="en-US" sz="1600" dirty="0"/>
+              <a:t>Income is reported as household income bins</a:t>
+            </a:r>
+          </a:p>
+          <a:p>
+            <a:pPr lvl="1"/>
+            <a:r>
+              <a:rPr lang="en-US" sz="1600" dirty="0"/>
+              <a:t>Correlation between education and income cannot be assumed to be entirely attributable to education</a:t>
+            </a:r>
+          </a:p>
+          <a:p>
+            <a:pPr lvl="1"/>
+            <a:r>
+              <a:rPr lang="en-US" sz="1600" dirty="0"/>
+              <a:t>The 2 “non-states” were outliers</a:t>
+            </a:r>
+          </a:p>
+          <a:p>
+            <a:pPr lvl="2"/>
+            <a:r>
+              <a:rPr lang="en-US" sz="1200" dirty="0"/>
+              <a:t>Puerto Rico for income</a:t>
+            </a:r>
+          </a:p>
+          <a:p>
+            <a:pPr lvl="2"/>
+            <a:r>
+              <a:rPr lang="en-US" sz="1200" dirty="0"/>
+              <a:t>Washington DC for education</a:t>
+            </a:r>
+          </a:p>
+          <a:p>
+            <a:r>
+              <a:rPr lang="en-US" sz="1800" dirty="0"/>
+              <a:t>Conclusions</a:t>
+            </a:r>
+          </a:p>
+          <a:p>
+            <a:pPr lvl="1"/>
+            <a:r>
+              <a:rPr lang="en-US" sz="1600" dirty="0"/>
+              <a:t>We found clear variation in mean household income and population education attainment by state and county</a:t>
+            </a:r>
+          </a:p>
+          <a:p>
+            <a:pPr lvl="2"/>
+            <a:r>
+              <a:rPr lang="en-US" sz="1400" dirty="0"/>
+              <a:t>A 10% increase in ‘College or higher’ education levels in a population was associated with more than $13,000 in household income</a:t>
+            </a:r>
+          </a:p>
+          <a:p>
+            <a:pPr lvl="1"/>
+            <a:r>
+              <a:rPr lang="en-US" sz="1600" dirty="0"/>
+              <a:t>There are large disparities in education attainment by state and county</a:t>
+            </a:r>
+          </a:p>
+        </p:txBody>
+      </p:sp>
+    </p:spTree>
+    <p:extLst>
+      <p:ext uri="{BB962C8B-B14F-4D97-AF65-F5344CB8AC3E}">
+        <p14:creationId xmlns:p14="http://schemas.microsoft.com/office/powerpoint/2010/main" val="1383792285"/>
       </p:ext>
     </p:extLst>
   </p:cSld>
@@ -21751,12 +21915,12 @@
 </file>
 
 <file path=customXml/item1.xml><?xml version="1.0" encoding="utf-8"?>
-<?mso-contentType ?>
-<FormTemplates xmlns="http://schemas.microsoft.com/sharepoint/v3/contenttype/forms">
-  <Display>DocumentLibraryForm</Display>
-  <Edit>DocumentLibraryForm</Edit>
-  <New>DocumentLibraryForm</New>
-</FormTemplates>
+<p:properties xmlns:p="http://schemas.microsoft.com/office/2006/metadata/properties" xmlns:xsi="http://www.w3.org/2001/XMLSchema-instance" xmlns:pc="http://schemas.microsoft.com/office/infopath/2007/PartnerControls">
+  <documentManagement>
+    <Status xmlns="71af3243-3dd4-4a8d-8c0d-dd76da1f02a5">Not started</Status>
+    <MediaServiceKeyPoints xmlns="71af3243-3dd4-4a8d-8c0d-dd76da1f02a5" xsi:nil="true"/>
+  </documentManagement>
+</p:properties>
 </file>
 
 <file path=customXml/item2.xml><?xml version="1.0" encoding="utf-8"?>
@@ -21981,18 +22145,20 @@
 </file>
 
 <file path=customXml/item3.xml><?xml version="1.0" encoding="utf-8"?>
-<p:properties xmlns:p="http://schemas.microsoft.com/office/2006/metadata/properties" xmlns:xsi="http://www.w3.org/2001/XMLSchema-instance" xmlns:pc="http://schemas.microsoft.com/office/infopath/2007/PartnerControls">
-  <documentManagement>
-    <Status xmlns="71af3243-3dd4-4a8d-8c0d-dd76da1f02a5">Not started</Status>
-    <MediaServiceKeyPoints xmlns="71af3243-3dd4-4a8d-8c0d-dd76da1f02a5" xsi:nil="true"/>
-  </documentManagement>
-</p:properties>
+<?mso-contentType ?>
+<FormTemplates xmlns="http://schemas.microsoft.com/sharepoint/v3/contenttype/forms">
+  <Display>DocumentLibraryForm</Display>
+  <Edit>DocumentLibraryForm</Edit>
+  <New>DocumentLibraryForm</New>
+</FormTemplates>
 </file>
 
 <file path=customXml/itemProps1.xml><?xml version="1.0" encoding="utf-8"?>
-<ds:datastoreItem xmlns:ds="http://schemas.openxmlformats.org/officeDocument/2006/customXml" ds:itemID="{30CB38EC-895A-4F8F-8F75-E263501ABB5A}">
+<ds:datastoreItem xmlns:ds="http://schemas.openxmlformats.org/officeDocument/2006/customXml" ds:itemID="{F7E70FC5-1855-47AB-8CE1-CB3C873A8988}">
   <ds:schemaRefs>
-    <ds:schemaRef ds:uri="http://schemas.microsoft.com/sharepoint/v3/contenttype/forms"/>
+    <ds:schemaRef ds:uri="http://schemas.microsoft.com/office/2006/metadata/properties"/>
+    <ds:schemaRef ds:uri="http://schemas.microsoft.com/office/infopath/2007/PartnerControls"/>
+    <ds:schemaRef ds:uri="71af3243-3dd4-4a8d-8c0d-dd76da1f02a5"/>
   </ds:schemaRefs>
 </ds:datastoreItem>
 </file>
@@ -22017,11 +22183,9 @@
 </file>
 
 <file path=customXml/itemProps3.xml><?xml version="1.0" encoding="utf-8"?>
-<ds:datastoreItem xmlns:ds="http://schemas.openxmlformats.org/officeDocument/2006/customXml" ds:itemID="{F7E70FC5-1855-47AB-8CE1-CB3C873A8988}">
+<ds:datastoreItem xmlns:ds="http://schemas.openxmlformats.org/officeDocument/2006/customXml" ds:itemID="{30CB38EC-895A-4F8F-8F75-E263501ABB5A}">
   <ds:schemaRefs>
-    <ds:schemaRef ds:uri="http://schemas.microsoft.com/office/2006/metadata/properties"/>
-    <ds:schemaRef ds:uri="http://schemas.microsoft.com/office/infopath/2007/PartnerControls"/>
-    <ds:schemaRef ds:uri="71af3243-3dd4-4a8d-8c0d-dd76da1f02a5"/>
+    <ds:schemaRef ds:uri="http://schemas.microsoft.com/sharepoint/v3/contenttype/forms"/>
   </ds:schemaRefs>
 </ds:datastoreItem>
 </file>
</xml_diff>

<commit_message>
updated final slide deck
</commit_message>
<xml_diff>
--- a/Education in America.pptx
+++ b/Education in America.pptx
@@ -15,8 +15,9 @@
     <p:sldId id="291" r:id="rId12"/>
     <p:sldId id="292" r:id="rId13"/>
     <p:sldId id="293" r:id="rId14"/>
-    <p:sldId id="295" r:id="rId15"/>
+    <p:sldId id="297" r:id="rId15"/>
     <p:sldId id="294" r:id="rId16"/>
+    <p:sldId id="296" r:id="rId17"/>
   </p:sldIdLst>
   <p:sldSz cx="12192000" cy="6858000"/>
   <p:notesSz cx="6858000" cy="9144000"/>
@@ -130,8 +131,9 @@
             <p14:sldId id="291"/>
             <p14:sldId id="292"/>
             <p14:sldId id="293"/>
-            <p14:sldId id="295"/>
+            <p14:sldId id="297"/>
             <p14:sldId id="294"/>
+            <p14:sldId id="296"/>
           </p14:sldIdLst>
         </p14:section>
         <p14:section name="Untitled Section" id="{0F7C94F2-3BBD-48D1-8D05-D586E3792BEF}">
@@ -9487,7 +9489,7 @@
           <a:p>
             <a:fld id="{88D38747-4367-4BD2-8D51-C97E202738E2}" type="datetime1">
               <a:rPr lang="en-US" smtClean="0"/>
-              <a:t>4/17/2020</a:t>
+              <a:t>4/18/2020</a:t>
             </a:fld>
             <a:endParaRPr lang="en-US" dirty="0"/>
           </a:p>
@@ -9792,7 +9794,7 @@
           <a:p>
             <a:fld id="{11F1B079-7EF0-44EE-B798-BCC497C9F3B2}" type="datetime1">
               <a:rPr lang="en-US" smtClean="0"/>
-              <a:t>4/17/2020</a:t>
+              <a:t>4/18/2020</a:t>
             </a:fld>
             <a:endParaRPr lang="en-US" dirty="0"/>
           </a:p>
@@ -9986,7 +9988,7 @@
           <a:p>
             <a:fld id="{28FF70A8-1D13-4657-95F0-A9EA54967B8D}" type="datetime1">
               <a:rPr lang="en-US" smtClean="0"/>
-              <a:t>4/17/2020</a:t>
+              <a:t>4/18/2020</a:t>
             </a:fld>
             <a:endParaRPr lang="en-US" dirty="0"/>
           </a:p>
@@ -10249,7 +10251,7 @@
           <a:p>
             <a:fld id="{21EB90AC-71BD-4C7F-8ACA-7B3F18292E63}" type="datetime1">
               <a:rPr lang="en-US" smtClean="0"/>
-              <a:t>4/17/2020</a:t>
+              <a:t>4/18/2020</a:t>
             </a:fld>
             <a:endParaRPr lang="en-US" dirty="0"/>
           </a:p>
@@ -10685,7 +10687,7 @@
           <a:p>
             <a:fld id="{4E6EFC2C-8905-46F0-B443-CE905B76BA01}" type="datetime1">
               <a:rPr lang="en-US" smtClean="0"/>
-              <a:t>4/17/2020</a:t>
+              <a:t>4/18/2020</a:t>
             </a:fld>
             <a:endParaRPr lang="en-US" dirty="0"/>
           </a:p>
@@ -11222,7 +11224,7 @@
           <a:p>
             <a:fld id="{D9079DC3-C9B5-499E-9140-0DC28B7074E2}" type="datetime1">
               <a:rPr lang="en-US" smtClean="0"/>
-              <a:t>4/17/2020</a:t>
+              <a:t>4/18/2020</a:t>
             </a:fld>
             <a:endParaRPr lang="en-US" dirty="0"/>
           </a:p>
@@ -12104,7 +12106,7 @@
           <a:p>
             <a:fld id="{30BB33EA-E472-4D22-9C03-A9C14AA21CED}" type="datetime1">
               <a:rPr lang="en-US" smtClean="0"/>
-              <a:t>4/17/2020</a:t>
+              <a:t>4/18/2020</a:t>
             </a:fld>
             <a:endParaRPr lang="en-US" dirty="0"/>
           </a:p>
@@ -12274,7 +12276,7 @@
           <a:p>
             <a:fld id="{73C55A3C-5767-4844-A0A3-83778C2E5409}" type="datetime1">
               <a:rPr lang="en-US" smtClean="0"/>
-              <a:t>4/17/2020</a:t>
+              <a:t>4/18/2020</a:t>
             </a:fld>
             <a:endParaRPr lang="en-US" dirty="0"/>
           </a:p>
@@ -12518,7 +12520,7 @@
           <a:p>
             <a:fld id="{CAE507A8-A5CF-4D38-AB86-7EDDA87A85D4}" type="datetime1">
               <a:rPr lang="en-US" smtClean="0"/>
-              <a:t>4/17/2020</a:t>
+              <a:t>4/18/2020</a:t>
             </a:fld>
             <a:endParaRPr lang="en-US" dirty="0"/>
           </a:p>
@@ -12760,7 +12762,7 @@
           <a:p>
             <a:fld id="{BDFCD27C-8599-43EF-BA1D-14DDC1946E06}" type="datetime1">
               <a:rPr lang="en-US" smtClean="0"/>
-              <a:t>4/17/2020</a:t>
+              <a:t>4/18/2020</a:t>
             </a:fld>
             <a:endParaRPr lang="en-US" dirty="0"/>
           </a:p>
@@ -13243,7 +13245,7 @@
           <a:p>
             <a:fld id="{49343D99-809A-49C0-96E5-4250D0B498EE}" type="datetime1">
               <a:rPr lang="en-US" smtClean="0"/>
-              <a:t>4/17/2020</a:t>
+              <a:t>4/18/2020</a:t>
             </a:fld>
             <a:endParaRPr lang="en-US" dirty="0"/>
           </a:p>
@@ -13361,7 +13363,7 @@
           <a:p>
             <a:fld id="{A143DE9B-B678-4EFB-BB7D-A4370204A0B0}" type="datetime1">
               <a:rPr lang="en-US" smtClean="0"/>
-              <a:t>4/17/2020</a:t>
+              <a:t>4/18/2020</a:t>
             </a:fld>
             <a:endParaRPr lang="en-US" dirty="0"/>
           </a:p>
@@ -13456,7 +13458,7 @@
           <a:p>
             <a:fld id="{E68812DA-F765-4142-A6A3-A8ED7235E082}" type="datetime1">
               <a:rPr lang="en-US" smtClean="0"/>
-              <a:t>4/17/2020</a:t>
+              <a:t>4/18/2020</a:t>
             </a:fld>
             <a:endParaRPr lang="en-US" dirty="0"/>
           </a:p>
@@ -13711,7 +13713,7 @@
           <a:p>
             <a:fld id="{3E0277FD-7DE6-41D4-930D-AC99F5AFE54E}" type="datetime1">
               <a:rPr lang="en-US" smtClean="0"/>
-              <a:t>4/17/2020</a:t>
+              <a:t>4/18/2020</a:t>
             </a:fld>
             <a:endParaRPr lang="en-US" dirty="0"/>
           </a:p>
@@ -14018,7 +14020,7 @@
           <a:p>
             <a:fld id="{9EA15526-7079-4B7B-987C-1B5FAE11A0FF}" type="datetime1">
               <a:rPr lang="en-US" smtClean="0"/>
-              <a:t>4/17/2020</a:t>
+              <a:t>4/18/2020</a:t>
             </a:fld>
             <a:endParaRPr lang="en-US" dirty="0"/>
           </a:p>
@@ -14253,7 +14255,7 @@
           <a:p>
             <a:fld id="{073ED0CC-082F-4160-86E5-0D6041F12778}" type="datetime1">
               <a:rPr lang="en-US" smtClean="0"/>
-              <a:t>4/17/2020</a:t>
+              <a:t>4/18/2020</a:t>
             </a:fld>
             <a:endParaRPr lang="en-US" dirty="0"/>
           </a:p>
@@ -15168,7 +15170,7 @@
           </a:effectLst>
           <a:extLst>
             <a:ext uri="{91240B29-F687-4f45-9708-019B960494DF}">
-              <a14:hiddenLine xmlns:a16="http://schemas.microsoft.com/office/drawing/2014/main" xmlns:p14="http://schemas.microsoft.com/office/powerpoint/2010/main" xmlns:a14="http://schemas.microsoft.com/office/drawing/2010/main" xmlns="" w="9525">
+              <a14:hiddenLine xmlns="" xmlns:a14="http://schemas.microsoft.com/office/drawing/2010/main" xmlns:p14="http://schemas.microsoft.com/office/powerpoint/2010/main" xmlns:a16="http://schemas.microsoft.com/office/drawing/2014/main" w="9525">
                 <a:solidFill>
                   <a:srgbClr val="000000"/>
                 </a:solidFill>
@@ -15965,36 +15967,6 @@
           </a:p>
         </p:txBody>
       </p:sp>
-      <p:pic>
-        <p:nvPicPr>
-          <p:cNvPr id="5" name="Picture 4" descr="A close up of a map&#10;&#10;Description automatically generated">
-            <a:extLst>
-              <a:ext uri="{FF2B5EF4-FFF2-40B4-BE49-F238E27FC236}">
-                <a16:creationId xmlns:a16="http://schemas.microsoft.com/office/drawing/2014/main" id="{EE407BF1-4A59-4C0F-AD20-D90C0CEE53F1}"/>
-              </a:ext>
-            </a:extLst>
-          </p:cNvPr>
-          <p:cNvPicPr>
-            <a:picLocks noChangeAspect="1"/>
-          </p:cNvPicPr>
-          <p:nvPr/>
-        </p:nvPicPr>
-        <p:blipFill>
-          <a:blip r:embed="rId2"/>
-          <a:stretch>
-            <a:fillRect/>
-          </a:stretch>
-        </p:blipFill>
-        <p:spPr>
-          <a:xfrm>
-            <a:off x="3591718" y="618148"/>
-            <a:ext cx="8387219" cy="5621703"/>
-          </a:xfrm>
-          <a:prstGeom prst="rect">
-            <a:avLst/>
-          </a:prstGeom>
-        </p:spPr>
-      </p:pic>
       <p:sp>
         <p:nvSpPr>
           <p:cNvPr id="6" name="Title 5">
@@ -16030,10 +16002,40 @@
           </a:p>
         </p:txBody>
       </p:sp>
+      <p:pic>
+        <p:nvPicPr>
+          <p:cNvPr id="4" name="Picture 3" descr="A picture containing text, map&#10;&#10;Description automatically generated">
+            <a:extLst>
+              <a:ext uri="{FF2B5EF4-FFF2-40B4-BE49-F238E27FC236}">
+                <a16:creationId xmlns:a16="http://schemas.microsoft.com/office/drawing/2014/main" id="{E2951ABA-0B10-4A8A-B700-2C8B5027604B}"/>
+              </a:ext>
+            </a:extLst>
+          </p:cNvPr>
+          <p:cNvPicPr>
+            <a:picLocks noChangeAspect="1"/>
+          </p:cNvPicPr>
+          <p:nvPr/>
+        </p:nvPicPr>
+        <p:blipFill>
+          <a:blip r:embed="rId2"/>
+          <a:stretch>
+            <a:fillRect/>
+          </a:stretch>
+        </p:blipFill>
+        <p:spPr>
+          <a:xfrm>
+            <a:off x="3481133" y="445207"/>
+            <a:ext cx="8757032" cy="5967586"/>
+          </a:xfrm>
+          <a:prstGeom prst="rect">
+            <a:avLst/>
+          </a:prstGeom>
+        </p:spPr>
+      </p:pic>
     </p:spTree>
     <p:extLst>
       <p:ext uri="{BB962C8B-B14F-4D97-AF65-F5344CB8AC3E}">
-        <p14:creationId xmlns:p14="http://schemas.microsoft.com/office/powerpoint/2010/main" val="1662076037"/>
+        <p14:creationId xmlns:p14="http://schemas.microsoft.com/office/powerpoint/2010/main" val="1162453086"/>
       </p:ext>
     </p:extLst>
   </p:cSld>
@@ -16170,6 +16172,168 @@
     <p:extLst>
       <p:ext uri="{BB962C8B-B14F-4D97-AF65-F5344CB8AC3E}">
         <p14:creationId xmlns:p14="http://schemas.microsoft.com/office/powerpoint/2010/main" val="4272263294"/>
+      </p:ext>
+    </p:extLst>
+  </p:cSld>
+  <p:clrMapOvr>
+    <a:masterClrMapping/>
+  </p:clrMapOvr>
+</p:sld>
+</file>
+
+<file path=ppt/slides/slide13.xml><?xml version="1.0" encoding="utf-8"?>
+<p:sld xmlns:a="http://schemas.openxmlformats.org/drawingml/2006/main" xmlns:r="http://schemas.openxmlformats.org/officeDocument/2006/relationships" xmlns:p="http://schemas.openxmlformats.org/presentationml/2006/main">
+  <p:cSld>
+    <p:spTree>
+      <p:nvGrpSpPr>
+        <p:cNvPr id="1" name=""/>
+        <p:cNvGrpSpPr/>
+        <p:nvPr/>
+      </p:nvGrpSpPr>
+      <p:grpSpPr>
+        <a:xfrm>
+          <a:off x="0" y="0"/>
+          <a:ext cx="0" cy="0"/>
+          <a:chOff x="0" y="0"/>
+          <a:chExt cx="0" cy="0"/>
+        </a:xfrm>
+      </p:grpSpPr>
+      <p:sp>
+        <p:nvSpPr>
+          <p:cNvPr id="2" name="Title 1">
+            <a:extLst>
+              <a:ext uri="{FF2B5EF4-FFF2-40B4-BE49-F238E27FC236}">
+                <a16:creationId xmlns:a16="http://schemas.microsoft.com/office/drawing/2014/main" id="{1CE70E73-5BD7-420A-ACF7-ECD27D28B991}"/>
+              </a:ext>
+            </a:extLst>
+          </p:cNvPr>
+          <p:cNvSpPr>
+            <a:spLocks noGrp="1"/>
+          </p:cNvSpPr>
+          <p:nvPr>
+            <p:ph type="title"/>
+          </p:nvPr>
+        </p:nvSpPr>
+        <p:spPr/>
+        <p:txBody>
+          <a:bodyPr/>
+          <a:lstStyle/>
+          <a:p>
+            <a:r>
+              <a:rPr lang="en-US" dirty="0"/>
+              <a:t>Data Limitations and Conclusions</a:t>
+            </a:r>
+          </a:p>
+        </p:txBody>
+      </p:sp>
+      <p:sp>
+        <p:nvSpPr>
+          <p:cNvPr id="3" name="Content Placeholder 2">
+            <a:extLst>
+              <a:ext uri="{FF2B5EF4-FFF2-40B4-BE49-F238E27FC236}">
+                <a16:creationId xmlns:a16="http://schemas.microsoft.com/office/drawing/2014/main" id="{47C027B6-1C4D-4D60-9287-C202A8EB18EC}"/>
+              </a:ext>
+            </a:extLst>
+          </p:cNvPr>
+          <p:cNvSpPr>
+            <a:spLocks noGrp="1"/>
+          </p:cNvSpPr>
+          <p:nvPr>
+            <p:ph idx="1"/>
+          </p:nvPr>
+        </p:nvSpPr>
+        <p:spPr>
+          <a:xfrm>
+            <a:off x="913795" y="1866900"/>
+            <a:ext cx="10353762" cy="4516145"/>
+          </a:xfrm>
+        </p:spPr>
+        <p:txBody>
+          <a:bodyPr>
+            <a:noAutofit/>
+          </a:bodyPr>
+          <a:lstStyle/>
+          <a:p>
+            <a:r>
+              <a:rPr lang="en-US" sz="1800" dirty="0"/>
+              <a:t>Limitations</a:t>
+            </a:r>
+          </a:p>
+          <a:p>
+            <a:pPr lvl="1"/>
+            <a:r>
+              <a:rPr lang="en-US" sz="1600" dirty="0"/>
+              <a:t>All data is self-reported</a:t>
+            </a:r>
+          </a:p>
+          <a:p>
+            <a:pPr lvl="1"/>
+            <a:r>
+              <a:rPr lang="en-US" sz="1600" dirty="0"/>
+              <a:t>Income is reported as household income bins</a:t>
+            </a:r>
+          </a:p>
+          <a:p>
+            <a:pPr lvl="1"/>
+            <a:r>
+              <a:rPr lang="en-US" sz="1600" dirty="0"/>
+              <a:t>Correlation between education and income cannot be assumed to be entirely attributable to education</a:t>
+            </a:r>
+          </a:p>
+          <a:p>
+            <a:pPr lvl="1"/>
+            <a:r>
+              <a:rPr lang="en-US" sz="1600" dirty="0"/>
+              <a:t>The 2 “non-states” were outliers</a:t>
+            </a:r>
+          </a:p>
+          <a:p>
+            <a:pPr lvl="2"/>
+            <a:r>
+              <a:rPr lang="en-US" sz="1200" dirty="0"/>
+              <a:t>Puerto Rico for income</a:t>
+            </a:r>
+          </a:p>
+          <a:p>
+            <a:pPr lvl="2"/>
+            <a:r>
+              <a:rPr lang="en-US" sz="1200" dirty="0"/>
+              <a:t>Washington DC for education</a:t>
+            </a:r>
+          </a:p>
+          <a:p>
+            <a:r>
+              <a:rPr lang="en-US" sz="1800" dirty="0"/>
+              <a:t>Conclusions</a:t>
+            </a:r>
+          </a:p>
+          <a:p>
+            <a:pPr lvl="1"/>
+            <a:r>
+              <a:rPr lang="en-US" sz="1600" dirty="0"/>
+              <a:t>We found clear variation in mean household income and population education attainment by state and county</a:t>
+            </a:r>
+          </a:p>
+          <a:p>
+            <a:pPr lvl="2"/>
+            <a:r>
+              <a:rPr lang="en-US" sz="1400" dirty="0"/>
+              <a:t>A 10% increase in ‘College or higher’ education levels in a population was associated with more than $13,000 in household income</a:t>
+            </a:r>
+          </a:p>
+          <a:p>
+            <a:pPr lvl="1"/>
+            <a:r>
+              <a:rPr lang="en-US" sz="1600" dirty="0"/>
+              <a:t>There are large disparities in education attainment by state and county</a:t>
+            </a:r>
+          </a:p>
+        </p:txBody>
+      </p:sp>
+    </p:spTree>
+    <p:extLst>
+      <p:ext uri="{BB962C8B-B14F-4D97-AF65-F5344CB8AC3E}">
+        <p14:creationId xmlns:p14="http://schemas.microsoft.com/office/powerpoint/2010/main" val="1383792285"/>
       </p:ext>
     </p:extLst>
   </p:cSld>
@@ -21751,12 +21915,12 @@
 </file>
 
 <file path=customXml/item1.xml><?xml version="1.0" encoding="utf-8"?>
-<?mso-contentType ?>
-<FormTemplates xmlns="http://schemas.microsoft.com/sharepoint/v3/contenttype/forms">
-  <Display>DocumentLibraryForm</Display>
-  <Edit>DocumentLibraryForm</Edit>
-  <New>DocumentLibraryForm</New>
-</FormTemplates>
+<p:properties xmlns:p="http://schemas.microsoft.com/office/2006/metadata/properties" xmlns:xsi="http://www.w3.org/2001/XMLSchema-instance" xmlns:pc="http://schemas.microsoft.com/office/infopath/2007/PartnerControls">
+  <documentManagement>
+    <Status xmlns="71af3243-3dd4-4a8d-8c0d-dd76da1f02a5">Not started</Status>
+    <MediaServiceKeyPoints xmlns="71af3243-3dd4-4a8d-8c0d-dd76da1f02a5" xsi:nil="true"/>
+  </documentManagement>
+</p:properties>
 </file>
 
 <file path=customXml/item2.xml><?xml version="1.0" encoding="utf-8"?>
@@ -21981,18 +22145,20 @@
 </file>
 
 <file path=customXml/item3.xml><?xml version="1.0" encoding="utf-8"?>
-<p:properties xmlns:p="http://schemas.microsoft.com/office/2006/metadata/properties" xmlns:xsi="http://www.w3.org/2001/XMLSchema-instance" xmlns:pc="http://schemas.microsoft.com/office/infopath/2007/PartnerControls">
-  <documentManagement>
-    <Status xmlns="71af3243-3dd4-4a8d-8c0d-dd76da1f02a5">Not started</Status>
-    <MediaServiceKeyPoints xmlns="71af3243-3dd4-4a8d-8c0d-dd76da1f02a5" xsi:nil="true"/>
-  </documentManagement>
-</p:properties>
+<?mso-contentType ?>
+<FormTemplates xmlns="http://schemas.microsoft.com/sharepoint/v3/contenttype/forms">
+  <Display>DocumentLibraryForm</Display>
+  <Edit>DocumentLibraryForm</Edit>
+  <New>DocumentLibraryForm</New>
+</FormTemplates>
 </file>
 
 <file path=customXml/itemProps1.xml><?xml version="1.0" encoding="utf-8"?>
-<ds:datastoreItem xmlns:ds="http://schemas.openxmlformats.org/officeDocument/2006/customXml" ds:itemID="{30CB38EC-895A-4F8F-8F75-E263501ABB5A}">
+<ds:datastoreItem xmlns:ds="http://schemas.openxmlformats.org/officeDocument/2006/customXml" ds:itemID="{F7E70FC5-1855-47AB-8CE1-CB3C873A8988}">
   <ds:schemaRefs>
-    <ds:schemaRef ds:uri="http://schemas.microsoft.com/sharepoint/v3/contenttype/forms"/>
+    <ds:schemaRef ds:uri="http://schemas.microsoft.com/office/2006/metadata/properties"/>
+    <ds:schemaRef ds:uri="http://schemas.microsoft.com/office/infopath/2007/PartnerControls"/>
+    <ds:schemaRef ds:uri="71af3243-3dd4-4a8d-8c0d-dd76da1f02a5"/>
   </ds:schemaRefs>
 </ds:datastoreItem>
 </file>
@@ -22017,11 +22183,9 @@
 </file>
 
 <file path=customXml/itemProps3.xml><?xml version="1.0" encoding="utf-8"?>
-<ds:datastoreItem xmlns:ds="http://schemas.openxmlformats.org/officeDocument/2006/customXml" ds:itemID="{F7E70FC5-1855-47AB-8CE1-CB3C873A8988}">
+<ds:datastoreItem xmlns:ds="http://schemas.openxmlformats.org/officeDocument/2006/customXml" ds:itemID="{30CB38EC-895A-4F8F-8F75-E263501ABB5A}">
   <ds:schemaRefs>
-    <ds:schemaRef ds:uri="http://schemas.microsoft.com/office/2006/metadata/properties"/>
-    <ds:schemaRef ds:uri="http://schemas.microsoft.com/office/infopath/2007/PartnerControls"/>
-    <ds:schemaRef ds:uri="71af3243-3dd4-4a8d-8c0d-dd76da1f02a5"/>
+    <ds:schemaRef ds:uri="http://schemas.microsoft.com/sharepoint/v3/contenttype/forms"/>
   </ds:schemaRefs>
 </ds:datastoreItem>
 </file>
</xml_diff>